<commit_message>
modification on pptx slide Demo by Dany
</commit_message>
<xml_diff>
--- a/presentations/présentationAMTSurvey.pptx
+++ b/presentations/présentationAMTSurvey.pptx
@@ -11,8 +11,8 @@
     <p:sldId id="259" r:id="rId5"/>
     <p:sldId id="263" r:id="rId6"/>
     <p:sldId id="262" r:id="rId7"/>
-    <p:sldId id="260" r:id="rId8"/>
-    <p:sldId id="261" r:id="rId9"/>
+    <p:sldId id="261" r:id="rId8"/>
+    <p:sldId id="260" r:id="rId9"/>
   </p:sldIdLst>
   <p:sldSz cx="12192000" cy="6858000"/>
   <p:notesSz cx="6858000" cy="9144000"/>
@@ -351,7 +351,7 @@
           <a:p>
             <a:fld id="{FFC93FFD-01D9-4A1C-9B58-BC4534047BF6}" type="slidenum">
               <a:rPr lang="fr-FR" smtClean="0"/>
-              <a:t>‹N°›</a:t>
+              <a:t>‹#›</a:t>
             </a:fld>
             <a:endParaRPr lang="fr-FR"/>
           </a:p>
@@ -626,7 +626,7 @@
           <a:p>
             <a:fld id="{FFC93FFD-01D9-4A1C-9B58-BC4534047BF6}" type="slidenum">
               <a:rPr lang="fr-FR" smtClean="0"/>
-              <a:t>‹N°›</a:t>
+              <a:t>‹#›</a:t>
             </a:fld>
             <a:endParaRPr lang="fr-FR"/>
           </a:p>
@@ -820,7 +820,7 @@
           <a:p>
             <a:fld id="{FFC93FFD-01D9-4A1C-9B58-BC4534047BF6}" type="slidenum">
               <a:rPr lang="fr-FR" smtClean="0"/>
-              <a:t>‹N°›</a:t>
+              <a:t>‹#›</a:t>
             </a:fld>
             <a:endParaRPr lang="fr-FR"/>
           </a:p>
@@ -1093,7 +1093,7 @@
           <a:p>
             <a:fld id="{FFC93FFD-01D9-4A1C-9B58-BC4534047BF6}" type="slidenum">
               <a:rPr lang="fr-FR" smtClean="0"/>
-              <a:t>‹N°›</a:t>
+              <a:t>‹#›</a:t>
             </a:fld>
             <a:endParaRPr lang="fr-FR"/>
           </a:p>
@@ -1434,7 +1434,7 @@
           <a:p>
             <a:fld id="{FFC93FFD-01D9-4A1C-9B58-BC4534047BF6}" type="slidenum">
               <a:rPr lang="fr-FR" smtClean="0"/>
-              <a:t>‹N°›</a:t>
+              <a:t>‹#›</a:t>
             </a:fld>
             <a:endParaRPr lang="fr-FR"/>
           </a:p>
@@ -2057,7 +2057,7 @@
           <a:p>
             <a:fld id="{FFC93FFD-01D9-4A1C-9B58-BC4534047BF6}" type="slidenum">
               <a:rPr lang="fr-FR" smtClean="0"/>
-              <a:t>‹N°›</a:t>
+              <a:t>‹#›</a:t>
             </a:fld>
             <a:endParaRPr lang="fr-FR"/>
           </a:p>
@@ -2917,7 +2917,7 @@
           <a:p>
             <a:fld id="{FFC93FFD-01D9-4A1C-9B58-BC4534047BF6}" type="slidenum">
               <a:rPr lang="fr-FR" smtClean="0"/>
-              <a:t>‹N°›</a:t>
+              <a:t>‹#›</a:t>
             </a:fld>
             <a:endParaRPr lang="fr-FR"/>
           </a:p>
@@ -3087,7 +3087,7 @@
           <a:p>
             <a:fld id="{FFC93FFD-01D9-4A1C-9B58-BC4534047BF6}" type="slidenum">
               <a:rPr lang="fr-FR" smtClean="0"/>
-              <a:t>‹N°›</a:t>
+              <a:t>‹#›</a:t>
             </a:fld>
             <a:endParaRPr lang="fr-FR"/>
           </a:p>
@@ -3267,7 +3267,7 @@
           <a:p>
             <a:fld id="{FFC93FFD-01D9-4A1C-9B58-BC4534047BF6}" type="slidenum">
               <a:rPr lang="fr-FR" smtClean="0"/>
-              <a:t>‹N°›</a:t>
+              <a:t>‹#›</a:t>
             </a:fld>
             <a:endParaRPr lang="fr-FR"/>
           </a:p>
@@ -3437,7 +3437,7 @@
           <a:p>
             <a:fld id="{FFC93FFD-01D9-4A1C-9B58-BC4534047BF6}" type="slidenum">
               <a:rPr lang="fr-FR" smtClean="0"/>
-              <a:t>‹N°›</a:t>
+              <a:t>‹#›</a:t>
             </a:fld>
             <a:endParaRPr lang="fr-FR"/>
           </a:p>
@@ -3684,7 +3684,7 @@
           <a:p>
             <a:fld id="{FFC93FFD-01D9-4A1C-9B58-BC4534047BF6}" type="slidenum">
               <a:rPr lang="fr-FR" smtClean="0"/>
-              <a:t>‹N°›</a:t>
+              <a:t>‹#›</a:t>
             </a:fld>
             <a:endParaRPr lang="fr-FR"/>
           </a:p>
@@ -3976,7 +3976,7 @@
           <a:p>
             <a:fld id="{FFC93FFD-01D9-4A1C-9B58-BC4534047BF6}" type="slidenum">
               <a:rPr lang="fr-FR" smtClean="0"/>
-              <a:t>‹N°›</a:t>
+              <a:t>‹#›</a:t>
             </a:fld>
             <a:endParaRPr lang="fr-FR"/>
           </a:p>
@@ -4420,7 +4420,7 @@
           <a:p>
             <a:fld id="{FFC93FFD-01D9-4A1C-9B58-BC4534047BF6}" type="slidenum">
               <a:rPr lang="fr-FR" smtClean="0"/>
-              <a:t>‹N°›</a:t>
+              <a:t>‹#›</a:t>
             </a:fld>
             <a:endParaRPr lang="fr-FR"/>
           </a:p>
@@ -4538,7 +4538,7 @@
           <a:p>
             <a:fld id="{FFC93FFD-01D9-4A1C-9B58-BC4534047BF6}" type="slidenum">
               <a:rPr lang="fr-FR" smtClean="0"/>
-              <a:t>‹N°›</a:t>
+              <a:t>‹#›</a:t>
             </a:fld>
             <a:endParaRPr lang="fr-FR"/>
           </a:p>
@@ -4633,7 +4633,7 @@
           <a:p>
             <a:fld id="{FFC93FFD-01D9-4A1C-9B58-BC4534047BF6}" type="slidenum">
               <a:rPr lang="fr-FR" smtClean="0"/>
-              <a:t>‹N°›</a:t>
+              <a:t>‹#›</a:t>
             </a:fld>
             <a:endParaRPr lang="fr-FR"/>
           </a:p>
@@ -4912,7 +4912,7 @@
           <a:p>
             <a:fld id="{FFC93FFD-01D9-4A1C-9B58-BC4534047BF6}" type="slidenum">
               <a:rPr lang="fr-FR" smtClean="0"/>
-              <a:t>‹N°›</a:t>
+              <a:t>‹#›</a:t>
             </a:fld>
             <a:endParaRPr lang="fr-FR"/>
           </a:p>
@@ -5187,7 +5187,7 @@
           <a:p>
             <a:fld id="{FFC93FFD-01D9-4A1C-9B58-BC4534047BF6}" type="slidenum">
               <a:rPr lang="fr-FR" smtClean="0"/>
-              <a:t>‹N°›</a:t>
+              <a:t>‹#›</a:t>
             </a:fld>
             <a:endParaRPr lang="fr-FR"/>
           </a:p>
@@ -5653,7 +5653,7 @@
           <a:p>
             <a:fld id="{FFC93FFD-01D9-4A1C-9B58-BC4534047BF6}" type="slidenum">
               <a:rPr lang="fr-FR" smtClean="0"/>
-              <a:t>‹N°›</a:t>
+              <a:t>‹#›</a:t>
             </a:fld>
             <a:endParaRPr lang="fr-FR"/>
           </a:p>
@@ -6107,7 +6107,7 @@
           <p:cNvPr id="2" name="Titre 1">
             <a:extLst>
               <a:ext uri="{FF2B5EF4-FFF2-40B4-BE49-F238E27FC236}">
-                <a16:creationId xmlns:a16="http://schemas.microsoft.com/office/drawing/2014/main" id="{AFB8454D-DA2D-40B3-AE39-F20DD50121D7}"/>
+                <a16:creationId xmlns:a16="http://schemas.microsoft.com/office/drawing/2014/main" xmlns="" id="{AFB8454D-DA2D-40B3-AE39-F20DD50121D7}"/>
               </a:ext>
             </a:extLst>
           </p:cNvPr>
@@ -6142,7 +6142,7 @@
           <p:cNvPr id="3" name="Sous-titre 2">
             <a:extLst>
               <a:ext uri="{FF2B5EF4-FFF2-40B4-BE49-F238E27FC236}">
-                <a16:creationId xmlns:a16="http://schemas.microsoft.com/office/drawing/2014/main" id="{421623F6-71A9-43F8-A81B-83A0EFA7D61B}"/>
+                <a16:creationId xmlns:a16="http://schemas.microsoft.com/office/drawing/2014/main" xmlns="" id="{421623F6-71A9-43F8-A81B-83A0EFA7D61B}"/>
               </a:ext>
             </a:extLst>
           </p:cNvPr>
@@ -6258,7 +6258,7 @@
           <p:cNvPr id="2" name="Titre 1">
             <a:extLst>
               <a:ext uri="{FF2B5EF4-FFF2-40B4-BE49-F238E27FC236}">
-                <a16:creationId xmlns:a16="http://schemas.microsoft.com/office/drawing/2014/main" id="{0265941B-7227-4AAD-9751-59DE671AAE85}"/>
+                <a16:creationId xmlns:a16="http://schemas.microsoft.com/office/drawing/2014/main" xmlns="" id="{0265941B-7227-4AAD-9751-59DE671AAE85}"/>
               </a:ext>
             </a:extLst>
           </p:cNvPr>
@@ -6287,7 +6287,7 @@
           <p:cNvPr id="3" name="Espace réservé du contenu 2">
             <a:extLst>
               <a:ext uri="{FF2B5EF4-FFF2-40B4-BE49-F238E27FC236}">
-                <a16:creationId xmlns:a16="http://schemas.microsoft.com/office/drawing/2014/main" id="{65978E4D-A2B9-480F-A457-FF6F5CFA1932}"/>
+                <a16:creationId xmlns:a16="http://schemas.microsoft.com/office/drawing/2014/main" xmlns="" id="{65978E4D-A2B9-480F-A457-FF6F5CFA1932}"/>
               </a:ext>
             </a:extLst>
           </p:cNvPr>
@@ -6380,7 +6380,7 @@
           <p:cNvPr id="2" name="Titre 1">
             <a:extLst>
               <a:ext uri="{FF2B5EF4-FFF2-40B4-BE49-F238E27FC236}">
-                <a16:creationId xmlns:a16="http://schemas.microsoft.com/office/drawing/2014/main" id="{1CAA5703-29E3-49A8-BCCC-79CA842949C3}"/>
+                <a16:creationId xmlns:a16="http://schemas.microsoft.com/office/drawing/2014/main" xmlns="" id="{1CAA5703-29E3-49A8-BCCC-79CA842949C3}"/>
               </a:ext>
             </a:extLst>
           </p:cNvPr>
@@ -6412,7 +6412,7 @@
           <p:cNvPr id="3" name="Espace réservé du contenu 2">
             <a:extLst>
               <a:ext uri="{FF2B5EF4-FFF2-40B4-BE49-F238E27FC236}">
-                <a16:creationId xmlns:a16="http://schemas.microsoft.com/office/drawing/2014/main" id="{586AD3A8-50EA-4C76-BF58-3DCDF38324D1}"/>
+                <a16:creationId xmlns:a16="http://schemas.microsoft.com/office/drawing/2014/main" xmlns="" id="{586AD3A8-50EA-4C76-BF58-3DCDF38324D1}"/>
               </a:ext>
             </a:extLst>
           </p:cNvPr>
@@ -6489,7 +6489,7 @@
           <p:cNvPr id="2" name="Titre 1">
             <a:extLst>
               <a:ext uri="{FF2B5EF4-FFF2-40B4-BE49-F238E27FC236}">
-                <a16:creationId xmlns:a16="http://schemas.microsoft.com/office/drawing/2014/main" id="{F5A9BF5D-05D2-4F7C-8292-8930F25783FE}"/>
+                <a16:creationId xmlns:a16="http://schemas.microsoft.com/office/drawing/2014/main" xmlns="" id="{F5A9BF5D-05D2-4F7C-8292-8930F25783FE}"/>
               </a:ext>
             </a:extLst>
           </p:cNvPr>
@@ -6521,7 +6521,7 @@
           <p:cNvPr id="4" name="Espace réservé du contenu 3">
             <a:extLst>
               <a:ext uri="{FF2B5EF4-FFF2-40B4-BE49-F238E27FC236}">
-                <a16:creationId xmlns:a16="http://schemas.microsoft.com/office/drawing/2014/main" id="{4DC9D20F-1F53-4B49-A097-D3972665A517}"/>
+                <a16:creationId xmlns:a16="http://schemas.microsoft.com/office/drawing/2014/main" xmlns="" id="{4DC9D20F-1F53-4B49-A097-D3972665A517}"/>
               </a:ext>
             </a:extLst>
           </p:cNvPr>
@@ -6582,7 +6582,7 @@
           <p:cNvPr id="2" name="Titre 1">
             <a:extLst>
               <a:ext uri="{FF2B5EF4-FFF2-40B4-BE49-F238E27FC236}">
-                <a16:creationId xmlns:a16="http://schemas.microsoft.com/office/drawing/2014/main" id="{B490A2A3-3B5B-46C1-9A50-4B78A0CA7C23}"/>
+                <a16:creationId xmlns:a16="http://schemas.microsoft.com/office/drawing/2014/main" xmlns="" id="{B490A2A3-3B5B-46C1-9A50-4B78A0CA7C23}"/>
               </a:ext>
             </a:extLst>
           </p:cNvPr>
@@ -6611,7 +6611,7 @@
           <p:cNvPr id="4" name="Espace réservé du contenu 3">
             <a:extLst>
               <a:ext uri="{FF2B5EF4-FFF2-40B4-BE49-F238E27FC236}">
-                <a16:creationId xmlns:a16="http://schemas.microsoft.com/office/drawing/2014/main" id="{A0FC5F68-C000-43A9-8B97-295A583A2F55}"/>
+                <a16:creationId xmlns:a16="http://schemas.microsoft.com/office/drawing/2014/main" xmlns="" id="{A0FC5F68-C000-43A9-8B97-295A583A2F55}"/>
               </a:ext>
             </a:extLst>
           </p:cNvPr>
@@ -6672,7 +6672,7 @@
           <p:cNvPr id="2" name="Titre 1">
             <a:extLst>
               <a:ext uri="{FF2B5EF4-FFF2-40B4-BE49-F238E27FC236}">
-                <a16:creationId xmlns:a16="http://schemas.microsoft.com/office/drawing/2014/main" id="{9ECBCB18-1FE0-42DD-8DF0-0FB6ADB1622F}"/>
+                <a16:creationId xmlns:a16="http://schemas.microsoft.com/office/drawing/2014/main" xmlns="" id="{9ECBCB18-1FE0-42DD-8DF0-0FB6ADB1622F}"/>
               </a:ext>
             </a:extLst>
           </p:cNvPr>
@@ -6704,7 +6704,7 @@
           <p:cNvPr id="3" name="Espace réservé du contenu 2">
             <a:extLst>
               <a:ext uri="{FF2B5EF4-FFF2-40B4-BE49-F238E27FC236}">
-                <a16:creationId xmlns:a16="http://schemas.microsoft.com/office/drawing/2014/main" id="{10B7C338-FE22-472C-BC4D-6A966198D7E7}"/>
+                <a16:creationId xmlns:a16="http://schemas.microsoft.com/office/drawing/2014/main" xmlns="" id="{10B7C338-FE22-472C-BC4D-6A966198D7E7}"/>
               </a:ext>
             </a:extLst>
           </p:cNvPr>
@@ -6720,6 +6720,22 @@
           <a:bodyPr/>
           <a:lstStyle/>
           <a:p>
+            <a:r>
+              <a:rPr lang="fr-FR" dirty="0" smtClean="0"/>
+              <a:t>Exceptions</a:t>
+            </a:r>
+          </a:p>
+          <a:p>
+            <a:r>
+              <a:rPr lang="fr-FR" dirty="0" smtClean="0"/>
+              <a:t>Validateurs</a:t>
+            </a:r>
+          </a:p>
+          <a:p>
+            <a:r>
+              <a:rPr lang="fr-FR" dirty="0" smtClean="0"/>
+              <a:t>DTO erreur</a:t>
+            </a:r>
             <a:endParaRPr lang="fr-FR" dirty="0"/>
           </a:p>
         </p:txBody>
@@ -6759,7 +6775,7 @@
           <p:cNvPr id="2" name="Titre 1">
             <a:extLst>
               <a:ext uri="{FF2B5EF4-FFF2-40B4-BE49-F238E27FC236}">
-                <a16:creationId xmlns:a16="http://schemas.microsoft.com/office/drawing/2014/main" id="{E3D16A58-BDEC-466A-81BE-F6271AB47C24}"/>
+                <a16:creationId xmlns:a16="http://schemas.microsoft.com/office/drawing/2014/main" xmlns="" id="{76217D22-3C37-40A3-8ACC-F6164019E369}"/>
               </a:ext>
             </a:extLst>
           </p:cNvPr>
@@ -6777,10 +6793,14 @@
           <a:p>
             <a:r>
               <a:rPr lang="fr-CH" dirty="0"/>
-              <a:t>Démonstrations</a:t>
+              <a:t>Particularités </a:t>
+            </a:r>
+            <a:r>
+              <a:rPr lang="fr-FR" dirty="0"/>
+              <a:t/>
             </a:r>
             <a:br>
-              <a:rPr lang="fr-CH" dirty="0"/>
+              <a:rPr lang="fr-FR" dirty="0"/>
             </a:br>
             <a:endParaRPr lang="fr-FR" dirty="0"/>
           </a:p>
@@ -6791,7 +6811,7 @@
           <p:cNvPr id="3" name="Espace réservé du contenu 2">
             <a:extLst>
               <a:ext uri="{FF2B5EF4-FFF2-40B4-BE49-F238E27FC236}">
-                <a16:creationId xmlns:a16="http://schemas.microsoft.com/office/drawing/2014/main" id="{896856A0-7D3E-44DB-8943-FD88FCD11F76}"/>
+                <a16:creationId xmlns:a16="http://schemas.microsoft.com/office/drawing/2014/main" xmlns="" id="{666069F6-9485-46F8-880A-2FE33037EE92}"/>
               </a:ext>
             </a:extLst>
           </p:cNvPr>
@@ -6809,21 +6829,30 @@
           <a:p>
             <a:r>
               <a:rPr lang="fr-CH" dirty="0"/>
-              <a:t>Scénarios: </a:t>
-            </a:r>
-          </a:p>
-          <a:p>
-            <a:pPr marL="0" indent="0">
-              <a:buNone/>
-            </a:pPr>
-            <a:endParaRPr lang="fr-CH" dirty="0"/>
+              <a:t>Voir README.md au chapitre </a:t>
+            </a:r>
+            <a:r>
+              <a:rPr lang="en-US" sz="1600" b="1" dirty="0"/>
+              <a:t>API </a:t>
+            </a:r>
+            <a:r>
+              <a:rPr lang="en-US" sz="1600" b="1" dirty="0" err="1"/>
+              <a:t>Utilisation</a:t>
+            </a:r>
+            <a:r>
+              <a:rPr lang="en-US" sz="1600" b="1" dirty="0"/>
+              <a:t> warnings and global operation</a:t>
+            </a:r>
+          </a:p>
+          <a:p>
+            <a:endParaRPr lang="fr-FR" dirty="0"/>
           </a:p>
         </p:txBody>
       </p:sp>
     </p:spTree>
     <p:extLst>
       <p:ext uri="{BB962C8B-B14F-4D97-AF65-F5344CB8AC3E}">
-        <p14:creationId xmlns:p14="http://schemas.microsoft.com/office/powerpoint/2010/main" val="2030014394"/>
+        <p14:creationId xmlns:p14="http://schemas.microsoft.com/office/powerpoint/2010/main" val="2147477563"/>
       </p:ext>
     </p:extLst>
   </p:cSld>
@@ -6855,7 +6884,7 @@
           <p:cNvPr id="2" name="Titre 1">
             <a:extLst>
               <a:ext uri="{FF2B5EF4-FFF2-40B4-BE49-F238E27FC236}">
-                <a16:creationId xmlns:a16="http://schemas.microsoft.com/office/drawing/2014/main" id="{76217D22-3C37-40A3-8ACC-F6164019E369}"/>
+                <a16:creationId xmlns:a16="http://schemas.microsoft.com/office/drawing/2014/main" xmlns="" id="{E3D16A58-BDEC-466A-81BE-F6271AB47C24}"/>
               </a:ext>
             </a:extLst>
           </p:cNvPr>
@@ -6873,10 +6902,10 @@
           <a:p>
             <a:r>
               <a:rPr lang="fr-CH" dirty="0"/>
-              <a:t>Particularités </a:t>
+              <a:t>Démonstrations</a:t>
             </a:r>
             <a:br>
-              <a:rPr lang="fr-FR" dirty="0"/>
+              <a:rPr lang="fr-CH" dirty="0"/>
             </a:br>
             <a:endParaRPr lang="fr-FR" dirty="0"/>
           </a:p>
@@ -6887,7 +6916,7 @@
           <p:cNvPr id="3" name="Espace réservé du contenu 2">
             <a:extLst>
               <a:ext uri="{FF2B5EF4-FFF2-40B4-BE49-F238E27FC236}">
-                <a16:creationId xmlns:a16="http://schemas.microsoft.com/office/drawing/2014/main" id="{666069F6-9485-46F8-880A-2FE33037EE92}"/>
+                <a16:creationId xmlns:a16="http://schemas.microsoft.com/office/drawing/2014/main" xmlns="" id="{896856A0-7D3E-44DB-8943-FD88FCD11F76}"/>
               </a:ext>
             </a:extLst>
           </p:cNvPr>
@@ -6898,37 +6927,170 @@
             <p:ph idx="1"/>
           </p:nvPr>
         </p:nvSpPr>
-        <p:spPr/>
-        <p:txBody>
-          <a:bodyPr/>
-          <a:lstStyle/>
-          <a:p>
-            <a:r>
-              <a:rPr lang="fr-CH" dirty="0"/>
-              <a:t>Voir README.md au chapitre </a:t>
-            </a:r>
-            <a:r>
-              <a:rPr lang="en-US" sz="1600" b="1" dirty="0"/>
-              <a:t>API </a:t>
-            </a:r>
-            <a:r>
-              <a:rPr lang="en-US" sz="1600" b="1" dirty="0" err="1"/>
-              <a:t>Utilisation</a:t>
-            </a:r>
-            <a:r>
-              <a:rPr lang="en-US" sz="1600" b="1" dirty="0"/>
-              <a:t> warnings and global operation</a:t>
-            </a:r>
-          </a:p>
-          <a:p>
-            <a:endParaRPr lang="fr-FR" dirty="0"/>
+        <p:spPr>
+          <a:xfrm>
+            <a:off x="1103312" y="2052918"/>
+            <a:ext cx="8946541" cy="4601100"/>
+          </a:xfrm>
+        </p:spPr>
+        <p:txBody>
+          <a:bodyPr>
+            <a:normAutofit/>
+          </a:bodyPr>
+          <a:lstStyle/>
+          <a:p>
+            <a:pPr>
+              <a:lnSpc>
+                <a:spcPct val="120000"/>
+              </a:lnSpc>
+            </a:pPr>
+            <a:r>
+              <a:rPr lang="fr-CH" sz="1600" dirty="0"/>
+              <a:t>Scénarios</a:t>
+            </a:r>
+            <a:r>
+              <a:rPr lang="fr-CH" sz="1600" dirty="0" smtClean="0"/>
+              <a:t>:</a:t>
+            </a:r>
+          </a:p>
+          <a:p>
+            <a:pPr>
+              <a:lnSpc>
+                <a:spcPct val="120000"/>
+              </a:lnSpc>
+            </a:pPr>
+            <a:r>
+              <a:rPr lang="fr-CH" sz="1600" dirty="0" smtClean="0"/>
+              <a:t>POST</a:t>
+            </a:r>
+            <a:endParaRPr lang="fr-CH" sz="1600" dirty="0" smtClean="0"/>
+          </a:p>
+          <a:p>
+            <a:pPr lvl="1">
+              <a:lnSpc>
+                <a:spcPct val="120000"/>
+              </a:lnSpc>
+            </a:pPr>
+            <a:r>
+              <a:rPr lang="fr-CH" sz="1400" dirty="0" smtClean="0"/>
+              <a:t>Création des questions possibles </a:t>
+            </a:r>
+          </a:p>
+          <a:p>
+            <a:pPr lvl="1">
+              <a:lnSpc>
+                <a:spcPct val="120000"/>
+              </a:lnSpc>
+            </a:pPr>
+            <a:r>
+              <a:rPr lang="fr-CH" sz="1400" dirty="0" smtClean="0"/>
+              <a:t>Création de deux Survey</a:t>
+            </a:r>
+          </a:p>
+          <a:p>
+            <a:pPr>
+              <a:lnSpc>
+                <a:spcPct val="120000"/>
+              </a:lnSpc>
+            </a:pPr>
+            <a:r>
+              <a:rPr lang="fr-CH" sz="1600" dirty="0" smtClean="0"/>
+              <a:t>GET</a:t>
+            </a:r>
+          </a:p>
+          <a:p>
+            <a:pPr lvl="1">
+              <a:lnSpc>
+                <a:spcPct val="120000"/>
+              </a:lnSpc>
+            </a:pPr>
+            <a:r>
+              <a:rPr lang="fr-CH" sz="1400" dirty="0" smtClean="0"/>
+              <a:t>Questions</a:t>
+            </a:r>
+          </a:p>
+          <a:p>
+            <a:pPr lvl="1">
+              <a:lnSpc>
+                <a:spcPct val="120000"/>
+              </a:lnSpc>
+            </a:pPr>
+            <a:r>
+              <a:rPr lang="fr-CH" sz="1400" dirty="0" err="1" smtClean="0"/>
+              <a:t>Surveys</a:t>
+            </a:r>
+            <a:endParaRPr lang="fr-CH" sz="1400" dirty="0" smtClean="0"/>
+          </a:p>
+          <a:p>
+            <a:pPr lvl="1">
+              <a:lnSpc>
+                <a:spcPct val="120000"/>
+              </a:lnSpc>
+            </a:pPr>
+            <a:r>
+              <a:rPr lang="fr-CH" sz="1400" dirty="0" err="1" smtClean="0"/>
+              <a:t>Answers</a:t>
+            </a:r>
+            <a:endParaRPr lang="fr-CH" sz="1400" dirty="0" smtClean="0"/>
+          </a:p>
+          <a:p>
+            <a:pPr>
+              <a:lnSpc>
+                <a:spcPct val="120000"/>
+              </a:lnSpc>
+            </a:pPr>
+            <a:r>
+              <a:rPr lang="fr-CH" sz="1600" dirty="0" smtClean="0"/>
+              <a:t>Erreur</a:t>
+            </a:r>
+          </a:p>
+          <a:p>
+            <a:pPr lvl="1">
+              <a:lnSpc>
+                <a:spcPct val="120000"/>
+              </a:lnSpc>
+            </a:pPr>
+            <a:r>
+              <a:rPr lang="fr-CH" sz="1400" dirty="0" smtClean="0"/>
+              <a:t>Champ manquant dans un POST </a:t>
+            </a:r>
+          </a:p>
+          <a:p>
+            <a:pPr lvl="1">
+              <a:lnSpc>
+                <a:spcPct val="120000"/>
+              </a:lnSpc>
+            </a:pPr>
+            <a:r>
+              <a:rPr lang="fr-CH" sz="1400" smtClean="0"/>
+              <a:t>Champ manquant dans un GET</a:t>
+            </a:r>
+            <a:endParaRPr lang="fr-CH" sz="1400" dirty="0" smtClean="0"/>
+          </a:p>
+          <a:p>
+            <a:pPr lvl="1">
+              <a:lnSpc>
+                <a:spcPct val="120000"/>
+              </a:lnSpc>
+            </a:pPr>
+            <a:endParaRPr lang="fr-CH" sz="1400" dirty="0" smtClean="0"/>
+          </a:p>
+          <a:p>
+            <a:pPr lvl="1"/>
+            <a:endParaRPr lang="fr-CH" dirty="0"/>
+          </a:p>
+          <a:p>
+            <a:pPr marL="0" indent="0">
+              <a:buNone/>
+            </a:pPr>
+            <a:endParaRPr lang="fr-CH" dirty="0"/>
           </a:p>
         </p:txBody>
       </p:sp>
     </p:spTree>
     <p:extLst>
       <p:ext uri="{BB962C8B-B14F-4D97-AF65-F5344CB8AC3E}">
-        <p14:creationId xmlns:p14="http://schemas.microsoft.com/office/powerpoint/2010/main" val="2147477563"/>
+        <p14:creationId xmlns:p14="http://schemas.microsoft.com/office/powerpoint/2010/main" val="2030014394"/>
       </p:ext>
     </p:extLst>
   </p:cSld>

</xml_diff>